<commit_message>
update class diagrame inside the pptx Update Presentation.pptx
</commit_message>
<xml_diff>
--- a/Presentation.pptx
+++ b/Presentation.pptx
@@ -207,7 +207,7 @@
           <a:p>
             <a:fld id="{0C13E8CC-381F-4F85-BDAB-732B26B1A0DD}" type="datetimeFigureOut">
               <a:rPr lang="fr-CH" smtClean="0"/>
-              <a:t>09.06.2022</a:t>
+              <a:t>15.06.2022</a:t>
             </a:fld>
             <a:endParaRPr lang="fr-CH"/>
           </a:p>
@@ -366,7 +366,7 @@
           <a:p>
             <a:fld id="{D70970E6-A9EF-4C77-8EA9-4E0C3CA50B9A}" type="slidenum">
               <a:rPr lang="fr-CH" smtClean="0"/>
-              <a:t>‹N°›</a:t>
+              <a:t>‹#›</a:t>
             </a:fld>
             <a:endParaRPr lang="fr-CH"/>
           </a:p>
@@ -1935,7 +1935,7 @@
           <a:p>
             <a:fld id="{1661375A-C223-44C8-917C-F7C3A1BCD50F}" type="datetimeFigureOut">
               <a:rPr lang="en-GB" smtClean="0"/>
-              <a:t>09/06/2022</a:t>
+              <a:t>15/06/2022</a:t>
             </a:fld>
             <a:endParaRPr lang="en-GB"/>
           </a:p>
@@ -1989,7 +1989,7 @@
           <a:p>
             <a:fld id="{6983841B-0DB4-4C99-B5E5-79625F01DBF7}" type="slidenum">
               <a:rPr lang="en-GB" smtClean="0"/>
-              <a:t>‹N°›</a:t>
+              <a:t>‹#›</a:t>
             </a:fld>
             <a:endParaRPr lang="en-GB"/>
           </a:p>
@@ -2135,7 +2135,7 @@
           <a:p>
             <a:fld id="{1661375A-C223-44C8-917C-F7C3A1BCD50F}" type="datetimeFigureOut">
               <a:rPr lang="en-GB" smtClean="0"/>
-              <a:t>09/06/2022</a:t>
+              <a:t>15/06/2022</a:t>
             </a:fld>
             <a:endParaRPr lang="en-GB"/>
           </a:p>
@@ -2189,7 +2189,7 @@
           <a:p>
             <a:fld id="{6983841B-0DB4-4C99-B5E5-79625F01DBF7}" type="slidenum">
               <a:rPr lang="en-GB" smtClean="0"/>
-              <a:t>‹N°›</a:t>
+              <a:t>‹#›</a:t>
             </a:fld>
             <a:endParaRPr lang="en-GB"/>
           </a:p>
@@ -2345,7 +2345,7 @@
           <a:p>
             <a:fld id="{1661375A-C223-44C8-917C-F7C3A1BCD50F}" type="datetimeFigureOut">
               <a:rPr lang="en-GB" smtClean="0"/>
-              <a:t>09/06/2022</a:t>
+              <a:t>15/06/2022</a:t>
             </a:fld>
             <a:endParaRPr lang="en-GB"/>
           </a:p>
@@ -2399,7 +2399,7 @@
           <a:p>
             <a:fld id="{6983841B-0DB4-4C99-B5E5-79625F01DBF7}" type="slidenum">
               <a:rPr lang="en-GB" smtClean="0"/>
-              <a:t>‹N°›</a:t>
+              <a:t>‹#›</a:t>
             </a:fld>
             <a:endParaRPr lang="en-GB"/>
           </a:p>
@@ -2545,7 +2545,7 @@
           <a:p>
             <a:fld id="{1661375A-C223-44C8-917C-F7C3A1BCD50F}" type="datetimeFigureOut">
               <a:rPr lang="en-GB" smtClean="0"/>
-              <a:t>09/06/2022</a:t>
+              <a:t>15/06/2022</a:t>
             </a:fld>
             <a:endParaRPr lang="en-GB"/>
           </a:p>
@@ -2599,7 +2599,7 @@
           <a:p>
             <a:fld id="{6983841B-0DB4-4C99-B5E5-79625F01DBF7}" type="slidenum">
               <a:rPr lang="en-GB" smtClean="0"/>
-              <a:t>‹N°›</a:t>
+              <a:t>‹#›</a:t>
             </a:fld>
             <a:endParaRPr lang="en-GB"/>
           </a:p>
@@ -2821,7 +2821,7 @@
           <a:p>
             <a:fld id="{1661375A-C223-44C8-917C-F7C3A1BCD50F}" type="datetimeFigureOut">
               <a:rPr lang="en-GB" smtClean="0"/>
-              <a:t>09/06/2022</a:t>
+              <a:t>15/06/2022</a:t>
             </a:fld>
             <a:endParaRPr lang="en-GB"/>
           </a:p>
@@ -2875,7 +2875,7 @@
           <a:p>
             <a:fld id="{6983841B-0DB4-4C99-B5E5-79625F01DBF7}" type="slidenum">
               <a:rPr lang="en-GB" smtClean="0"/>
-              <a:t>‹N°›</a:t>
+              <a:t>‹#›</a:t>
             </a:fld>
             <a:endParaRPr lang="en-GB"/>
           </a:p>
@@ -3089,7 +3089,7 @@
           <a:p>
             <a:fld id="{1661375A-C223-44C8-917C-F7C3A1BCD50F}" type="datetimeFigureOut">
               <a:rPr lang="en-GB" smtClean="0"/>
-              <a:t>09/06/2022</a:t>
+              <a:t>15/06/2022</a:t>
             </a:fld>
             <a:endParaRPr lang="en-GB"/>
           </a:p>
@@ -3143,7 +3143,7 @@
           <a:p>
             <a:fld id="{6983841B-0DB4-4C99-B5E5-79625F01DBF7}" type="slidenum">
               <a:rPr lang="en-GB" smtClean="0"/>
-              <a:t>‹N°›</a:t>
+              <a:t>‹#›</a:t>
             </a:fld>
             <a:endParaRPr lang="en-GB"/>
           </a:p>
@@ -3504,7 +3504,7 @@
           <a:p>
             <a:fld id="{1661375A-C223-44C8-917C-F7C3A1BCD50F}" type="datetimeFigureOut">
               <a:rPr lang="en-GB" smtClean="0"/>
-              <a:t>09/06/2022</a:t>
+              <a:t>15/06/2022</a:t>
             </a:fld>
             <a:endParaRPr lang="en-GB"/>
           </a:p>
@@ -3558,7 +3558,7 @@
           <a:p>
             <a:fld id="{6983841B-0DB4-4C99-B5E5-79625F01DBF7}" type="slidenum">
               <a:rPr lang="en-GB" smtClean="0"/>
-              <a:t>‹N°›</a:t>
+              <a:t>‹#›</a:t>
             </a:fld>
             <a:endParaRPr lang="en-GB"/>
           </a:p>
@@ -3646,7 +3646,7 @@
           <a:p>
             <a:fld id="{1661375A-C223-44C8-917C-F7C3A1BCD50F}" type="datetimeFigureOut">
               <a:rPr lang="en-GB" smtClean="0"/>
-              <a:t>09/06/2022</a:t>
+              <a:t>15/06/2022</a:t>
             </a:fld>
             <a:endParaRPr lang="en-GB"/>
           </a:p>
@@ -3700,7 +3700,7 @@
           <a:p>
             <a:fld id="{6983841B-0DB4-4C99-B5E5-79625F01DBF7}" type="slidenum">
               <a:rPr lang="en-GB" smtClean="0"/>
-              <a:t>‹N°›</a:t>
+              <a:t>‹#›</a:t>
             </a:fld>
             <a:endParaRPr lang="en-GB"/>
           </a:p>
@@ -3759,7 +3759,7 @@
           <a:p>
             <a:fld id="{1661375A-C223-44C8-917C-F7C3A1BCD50F}" type="datetimeFigureOut">
               <a:rPr lang="en-GB" smtClean="0"/>
-              <a:t>09/06/2022</a:t>
+              <a:t>15/06/2022</a:t>
             </a:fld>
             <a:endParaRPr lang="en-GB"/>
           </a:p>
@@ -3813,7 +3813,7 @@
           <a:p>
             <a:fld id="{6983841B-0DB4-4C99-B5E5-79625F01DBF7}" type="slidenum">
               <a:rPr lang="en-GB" smtClean="0"/>
-              <a:t>‹N°›</a:t>
+              <a:t>‹#›</a:t>
             </a:fld>
             <a:endParaRPr lang="en-GB"/>
           </a:p>
@@ -4072,7 +4072,7 @@
           <a:p>
             <a:fld id="{1661375A-C223-44C8-917C-F7C3A1BCD50F}" type="datetimeFigureOut">
               <a:rPr lang="en-GB" smtClean="0"/>
-              <a:t>09/06/2022</a:t>
+              <a:t>15/06/2022</a:t>
             </a:fld>
             <a:endParaRPr lang="en-GB"/>
           </a:p>
@@ -4126,7 +4126,7 @@
           <a:p>
             <a:fld id="{6983841B-0DB4-4C99-B5E5-79625F01DBF7}" type="slidenum">
               <a:rPr lang="en-GB" smtClean="0"/>
-              <a:t>‹N°›</a:t>
+              <a:t>‹#›</a:t>
             </a:fld>
             <a:endParaRPr lang="en-GB"/>
           </a:p>
@@ -4361,7 +4361,7 @@
           <a:p>
             <a:fld id="{1661375A-C223-44C8-917C-F7C3A1BCD50F}" type="datetimeFigureOut">
               <a:rPr lang="en-GB" smtClean="0"/>
-              <a:t>09/06/2022</a:t>
+              <a:t>15/06/2022</a:t>
             </a:fld>
             <a:endParaRPr lang="en-GB"/>
           </a:p>
@@ -4415,7 +4415,7 @@
           <a:p>
             <a:fld id="{6983841B-0DB4-4C99-B5E5-79625F01DBF7}" type="slidenum">
               <a:rPr lang="en-GB" smtClean="0"/>
-              <a:t>‹N°›</a:t>
+              <a:t>‹#›</a:t>
             </a:fld>
             <a:endParaRPr lang="en-GB"/>
           </a:p>
@@ -4604,7 +4604,7 @@
           <a:p>
             <a:fld id="{1661375A-C223-44C8-917C-F7C3A1BCD50F}" type="datetimeFigureOut">
               <a:rPr lang="en-GB" smtClean="0"/>
-              <a:t>09/06/2022</a:t>
+              <a:t>15/06/2022</a:t>
             </a:fld>
             <a:endParaRPr lang="en-GB"/>
           </a:p>
@@ -4694,7 +4694,7 @@
           <a:p>
             <a:fld id="{6983841B-0DB4-4C99-B5E5-79625F01DBF7}" type="slidenum">
               <a:rPr lang="en-GB" smtClean="0"/>
-              <a:t>‹N°›</a:t>
+              <a:t>‹#›</a:t>
             </a:fld>
             <a:endParaRPr lang="en-GB"/>
           </a:p>
@@ -17533,10 +17533,10 @@
       </p:sp>
       <p:pic>
         <p:nvPicPr>
-          <p:cNvPr id="6" name="Image 5">
+          <p:cNvPr id="16" name="Graphic 15">
             <a:extLst>
               <a:ext uri="{FF2B5EF4-FFF2-40B4-BE49-F238E27FC236}">
-                <a16:creationId xmlns:a16="http://schemas.microsoft.com/office/drawing/2014/main" id="{2B784ACB-95BA-3022-EA28-4AF3658A5AE1}"/>
+                <a16:creationId xmlns:a16="http://schemas.microsoft.com/office/drawing/2014/main" id="{1B5CE031-4D27-9A67-BCA0-F93A6A676557}"/>
               </a:ext>
             </a:extLst>
           </p:cNvPr>
@@ -17545,73 +17545,25 @@
           </p:cNvPicPr>
           <p:nvPr/>
         </p:nvPicPr>
-        <p:blipFill rotWithShape="1">
-          <a:blip r:embed="rId4"/>
-          <a:srcRect b="82302"/>
-          <a:stretch/>
+        <p:blipFill>
+          <a:blip r:embed="rId4">
+            <a:extLst>
+              <a:ext uri="{28A0092B-C50C-407E-A947-70E740481C1C}">
+                <a14:useLocalDpi xmlns:a14="http://schemas.microsoft.com/office/drawing/2010/main" val="0"/>
+              </a:ext>
+              <a:ext uri="{96DAC541-7B7A-43D3-8B79-37D633B846F1}">
+                <asvg:svgBlip xmlns:asvg="http://schemas.microsoft.com/office/drawing/2016/SVG/main" r:embed="rId5"/>
+              </a:ext>
+            </a:extLst>
+          </a:blip>
+          <a:stretch>
+            <a:fillRect/>
+          </a:stretch>
         </p:blipFill>
         <p:spPr>
           <a:xfrm>
-            <a:off x="5228032" y="911666"/>
-            <a:ext cx="5761219" cy="927913"/>
-          </a:xfrm>
-          <a:prstGeom prst="rect">
-            <a:avLst/>
-          </a:prstGeom>
-        </p:spPr>
-      </p:pic>
-      <p:pic>
-        <p:nvPicPr>
-          <p:cNvPr id="19" name="Image 18">
-            <a:extLst>
-              <a:ext uri="{FF2B5EF4-FFF2-40B4-BE49-F238E27FC236}">
-                <a16:creationId xmlns:a16="http://schemas.microsoft.com/office/drawing/2014/main" id="{F1AC7C84-45FA-84F3-729A-298C00D74D70}"/>
-              </a:ext>
-            </a:extLst>
-          </p:cNvPr>
-          <p:cNvPicPr>
-            <a:picLocks noChangeAspect="1"/>
-          </p:cNvPicPr>
-          <p:nvPr/>
-        </p:nvPicPr>
-        <p:blipFill rotWithShape="1">
-          <a:blip r:embed="rId4"/>
-          <a:srcRect t="52316" b="12003"/>
-          <a:stretch/>
-        </p:blipFill>
-        <p:spPr>
-          <a:xfrm>
-            <a:off x="5228032" y="3654603"/>
-            <a:ext cx="5761219" cy="1870772"/>
-          </a:xfrm>
-          <a:prstGeom prst="rect">
-            <a:avLst/>
-          </a:prstGeom>
-        </p:spPr>
-      </p:pic>
-      <p:pic>
-        <p:nvPicPr>
-          <p:cNvPr id="20" name="Image 19">
-            <a:extLst>
-              <a:ext uri="{FF2B5EF4-FFF2-40B4-BE49-F238E27FC236}">
-                <a16:creationId xmlns:a16="http://schemas.microsoft.com/office/drawing/2014/main" id="{5C053B44-E565-B60D-CE2E-80D91B6432C6}"/>
-              </a:ext>
-            </a:extLst>
-          </p:cNvPr>
-          <p:cNvPicPr>
-            <a:picLocks noChangeAspect="1"/>
-          </p:cNvPicPr>
-          <p:nvPr/>
-        </p:nvPicPr>
-        <p:blipFill rotWithShape="1">
-          <a:blip r:embed="rId4"/>
-          <a:srcRect t="17698" b="47684"/>
-          <a:stretch/>
-        </p:blipFill>
-        <p:spPr>
-          <a:xfrm>
-            <a:off x="5228032" y="1839579"/>
-            <a:ext cx="5761219" cy="1815024"/>
+            <a:off x="4694562" y="1138706"/>
+            <a:ext cx="6940225" cy="4735529"/>
           </a:xfrm>
           <a:prstGeom prst="rect">
             <a:avLst/>
@@ -17731,33 +17683,6 @@
                                   </p:childTnLst>
                                 </p:cTn>
                               </p:par>
-                              <p:par>
-                                <p:cTn id="11" presetID="1" presetClass="entr" presetSubtype="0" fill="hold" nodeType="withEffect">
-                                  <p:stCondLst>
-                                    <p:cond delay="0"/>
-                                  </p:stCondLst>
-                                  <p:childTnLst>
-                                    <p:set>
-                                      <p:cBhvr>
-                                        <p:cTn id="12" dur="1" fill="hold">
-                                          <p:stCondLst>
-                                            <p:cond delay="0"/>
-                                          </p:stCondLst>
-                                        </p:cTn>
-                                        <p:tgtEl>
-                                          <p:spTgt spid="6"/>
-                                        </p:tgtEl>
-                                        <p:attrNameLst>
-                                          <p:attrName>style.visibility</p:attrName>
-                                        </p:attrNameLst>
-                                      </p:cBhvr>
-                                      <p:to>
-                                        <p:strVal val="visible"/>
-                                      </p:to>
-                                    </p:set>
-                                  </p:childTnLst>
-                                </p:cTn>
-                              </p:par>
                             </p:childTnLst>
                           </p:cTn>
                         </p:par>
@@ -17765,26 +17690,26 @@
                     </p:cTn>
                   </p:par>
                   <p:par>
-                    <p:cTn id="13" fill="hold">
+                    <p:cTn id="11" fill="hold">
                       <p:stCondLst>
                         <p:cond delay="indefinite"/>
                       </p:stCondLst>
                       <p:childTnLst>
                         <p:par>
-                          <p:cTn id="14" fill="hold">
+                          <p:cTn id="12" fill="hold">
                             <p:stCondLst>
                               <p:cond delay="0"/>
                             </p:stCondLst>
                             <p:childTnLst>
                               <p:par>
-                                <p:cTn id="15" presetID="1" presetClass="entr" presetSubtype="0" fill="hold" nodeType="clickEffect">
+                                <p:cTn id="13" presetID="1" presetClass="entr" presetSubtype="0" fill="hold" nodeType="clickEffect">
                                   <p:stCondLst>
                                     <p:cond delay="0"/>
                                   </p:stCondLst>
                                   <p:childTnLst>
                                     <p:set>
                                       <p:cBhvr>
-                                        <p:cTn id="16" dur="1" fill="hold">
+                                        <p:cTn id="14" dur="1" fill="hold">
                                           <p:stCondLst>
                                             <p:cond delay="0"/>
                                           </p:stCondLst>
@@ -17807,8 +17732,26 @@
                                   </p:childTnLst>
                                 </p:cTn>
                               </p:par>
+                            </p:childTnLst>
+                          </p:cTn>
+                        </p:par>
+                      </p:childTnLst>
+                    </p:cTn>
+                  </p:par>
+                  <p:par>
+                    <p:cTn id="15" fill="hold">
+                      <p:stCondLst>
+                        <p:cond delay="indefinite"/>
+                      </p:stCondLst>
+                      <p:childTnLst>
+                        <p:par>
+                          <p:cTn id="16" fill="hold">
+                            <p:stCondLst>
+                              <p:cond delay="0"/>
+                            </p:stCondLst>
+                            <p:childTnLst>
                               <p:par>
-                                <p:cTn id="17" presetID="1" presetClass="entr" presetSubtype="0" fill="hold" nodeType="withEffect">
+                                <p:cTn id="17" presetID="1" presetClass="entr" presetSubtype="0" fill="hold" nodeType="clickEffect">
                                   <p:stCondLst>
                                     <p:cond delay="0"/>
                                   </p:stCondLst>
@@ -17816,51 +17759,6 @@
                                     <p:set>
                                       <p:cBhvr>
                                         <p:cTn id="18" dur="1" fill="hold">
-                                          <p:stCondLst>
-                                            <p:cond delay="0"/>
-                                          </p:stCondLst>
-                                        </p:cTn>
-                                        <p:tgtEl>
-                                          <p:spTgt spid="20"/>
-                                        </p:tgtEl>
-                                        <p:attrNameLst>
-                                          <p:attrName>style.visibility</p:attrName>
-                                        </p:attrNameLst>
-                                      </p:cBhvr>
-                                      <p:to>
-                                        <p:strVal val="visible"/>
-                                      </p:to>
-                                    </p:set>
-                                  </p:childTnLst>
-                                </p:cTn>
-                              </p:par>
-                            </p:childTnLst>
-                          </p:cTn>
-                        </p:par>
-                      </p:childTnLst>
-                    </p:cTn>
-                  </p:par>
-                  <p:par>
-                    <p:cTn id="19" fill="hold">
-                      <p:stCondLst>
-                        <p:cond delay="indefinite"/>
-                      </p:stCondLst>
-                      <p:childTnLst>
-                        <p:par>
-                          <p:cTn id="20" fill="hold">
-                            <p:stCondLst>
-                              <p:cond delay="0"/>
-                            </p:stCondLst>
-                            <p:childTnLst>
-                              <p:par>
-                                <p:cTn id="21" presetID="1" presetClass="entr" presetSubtype="0" fill="hold" nodeType="clickEffect">
-                                  <p:stCondLst>
-                                    <p:cond delay="0"/>
-                                  </p:stCondLst>
-                                  <p:childTnLst>
-                                    <p:set>
-                                      <p:cBhvr>
-                                        <p:cTn id="22" dur="1" fill="hold">
                                           <p:stCondLst>
                                             <p:cond delay="0"/>
                                           </p:stCondLst>
@@ -17884,14 +17782,14 @@
                                 </p:cTn>
                               </p:par>
                               <p:par>
-                                <p:cTn id="23" presetID="1" presetClass="entr" presetSubtype="0" fill="hold" nodeType="withEffect">
+                                <p:cTn id="19" presetID="1" presetClass="entr" presetSubtype="0" fill="hold" nodeType="withEffect">
                                   <p:stCondLst>
                                     <p:cond delay="0"/>
                                   </p:stCondLst>
                                   <p:childTnLst>
                                     <p:set>
                                       <p:cBhvr>
-                                        <p:cTn id="24" dur="1" fill="hold">
+                                        <p:cTn id="20" dur="1" fill="hold">
                                           <p:stCondLst>
                                             <p:cond delay="0"/>
                                           </p:stCondLst>
@@ -17902,33 +17800,6 @@
                                               <p:pRg st="4" end="4"/>
                                             </p:txEl>
                                           </p:spTgt>
-                                        </p:tgtEl>
-                                        <p:attrNameLst>
-                                          <p:attrName>style.visibility</p:attrName>
-                                        </p:attrNameLst>
-                                      </p:cBhvr>
-                                      <p:to>
-                                        <p:strVal val="visible"/>
-                                      </p:to>
-                                    </p:set>
-                                  </p:childTnLst>
-                                </p:cTn>
-                              </p:par>
-                              <p:par>
-                                <p:cTn id="25" presetID="1" presetClass="entr" presetSubtype="0" fill="hold" nodeType="withEffect">
-                                  <p:stCondLst>
-                                    <p:cond delay="0"/>
-                                  </p:stCondLst>
-                                  <p:childTnLst>
-                                    <p:set>
-                                      <p:cBhvr>
-                                        <p:cTn id="26" dur="1" fill="hold">
-                                          <p:stCondLst>
-                                            <p:cond delay="0"/>
-                                          </p:stCondLst>
-                                        </p:cTn>
-                                        <p:tgtEl>
-                                          <p:spTgt spid="19"/>
                                         </p:tgtEl>
                                         <p:attrNameLst>
                                           <p:attrName>style.visibility</p:attrName>

</xml_diff>